<commit_message>
updating for license and resource docs
</commit_message>
<xml_diff>
--- a/docs/resources/Database_Schema.pptx
+++ b/docs/resources/Database_Schema.pptx
@@ -213,7 +213,7 @@
           </a:lstStyle>
           <a:p>
             <a:fld id="{9D67FED6-1CE0-9E49-8E28-4BC1AFD39CD7}" type="datetimeFigureOut">
-              <a:t>10/10/19</a:t>
+              <a:t>6/4/20</a:t>
             </a:fld>
             <a:endParaRPr lang="en-US"/>
           </a:p>
@@ -523,7 +523,7 @@
           <a:bodyPr/>
           <a:lstStyle/>
           <a:p>
-            <a:endParaRPr lang="en-US"/>
+            <a:endParaRPr lang="en-US" dirty="0"/>
           </a:p>
         </p:txBody>
       </p:sp>
@@ -17360,8 +17360,8 @@
         </p:nvSpPr>
         <p:spPr>
           <a:xfrm>
-            <a:off x="4221476" y="469"/>
-            <a:ext cx="2786810" cy="3741362"/>
+            <a:off x="4221475" y="469"/>
+            <a:ext cx="3271003" cy="3695693"/>
           </a:xfrm>
           <a:prstGeom prst="rect">
             <a:avLst/>
@@ -17416,8 +17416,8 @@
         </p:nvSpPr>
         <p:spPr>
           <a:xfrm>
-            <a:off x="6983108" y="0"/>
-            <a:ext cx="2160892" cy="3739528"/>
+            <a:off x="7485530" y="0"/>
+            <a:ext cx="1658469" cy="3696162"/>
           </a:xfrm>
           <a:prstGeom prst="rect">
             <a:avLst/>
@@ -17527,8 +17527,8 @@
         </p:nvSpPr>
         <p:spPr>
           <a:xfrm>
-            <a:off x="2920445" y="3741362"/>
-            <a:ext cx="3904464" cy="1396347"/>
+            <a:off x="2920444" y="3696162"/>
+            <a:ext cx="4071515" cy="1441547"/>
           </a:xfrm>
           <a:prstGeom prst="rect">
             <a:avLst/>
@@ -17582,8 +17582,8 @@
         </p:nvSpPr>
         <p:spPr>
           <a:xfrm>
-            <a:off x="5605233" y="-2"/>
-            <a:ext cx="1396139" cy="1665881"/>
+            <a:off x="5605232" y="-2"/>
+            <a:ext cx="1893733" cy="1754588"/>
           </a:xfrm>
           <a:prstGeom prst="rect">
             <a:avLst/>
@@ -17638,7 +17638,7 @@
         <p:spPr>
           <a:xfrm>
             <a:off x="2920445" y="0"/>
-            <a:ext cx="1303324" cy="3741362"/>
+            <a:ext cx="1303324" cy="3711944"/>
           </a:xfrm>
           <a:prstGeom prst="rect">
             <a:avLst/>
@@ -17929,8 +17929,8 @@
         </p:nvCxnSpPr>
         <p:spPr>
           <a:xfrm>
-            <a:off x="5627450" y="455930"/>
-            <a:ext cx="124218" cy="0"/>
+            <a:off x="5699867" y="454502"/>
+            <a:ext cx="160640" cy="0"/>
           </a:xfrm>
           <a:prstGeom prst="line">
             <a:avLst/>
@@ -17967,9 +17967,9 @@
           <p:nvPr/>
         </p:nvCxnSpPr>
         <p:spPr>
-          <a:xfrm flipH="1">
-            <a:off x="5370425" y="914808"/>
-            <a:ext cx="252287" cy="0"/>
+          <a:xfrm flipH="1" flipV="1">
+            <a:off x="5370426" y="914808"/>
+            <a:ext cx="343141" cy="712"/>
           </a:xfrm>
           <a:prstGeom prst="line">
             <a:avLst/>
@@ -18007,8 +18007,8 @@
         </p:nvCxnSpPr>
         <p:spPr>
           <a:xfrm flipH="1">
-            <a:off x="5370427" y="685368"/>
-            <a:ext cx="252285" cy="0"/>
+            <a:off x="5373959" y="685368"/>
+            <a:ext cx="325670" cy="0"/>
           </a:xfrm>
           <a:prstGeom prst="line">
             <a:avLst/>
@@ -18319,7 +18319,7 @@
         </p:nvCxnSpPr>
         <p:spPr>
           <a:xfrm flipH="1" flipV="1">
-            <a:off x="4059793" y="3044985"/>
+            <a:off x="4059793" y="2869494"/>
             <a:ext cx="318650" cy="1514"/>
           </a:xfrm>
           <a:prstGeom prst="line">
@@ -18358,7 +18358,7 @@
         </p:nvCxnSpPr>
         <p:spPr>
           <a:xfrm flipH="1">
-            <a:off x="2857217" y="3042282"/>
+            <a:off x="2857217" y="2876028"/>
             <a:ext cx="255894" cy="0"/>
           </a:xfrm>
           <a:prstGeom prst="line">
@@ -18398,7 +18398,7 @@
         <p:spPr>
           <a:xfrm>
             <a:off x="2852624" y="2806567"/>
-            <a:ext cx="0" cy="238418"/>
+            <a:ext cx="0" cy="69461"/>
           </a:xfrm>
           <a:prstGeom prst="line">
             <a:avLst/>
@@ -18475,7 +18475,7 @@
         </p:nvCxnSpPr>
         <p:spPr>
           <a:xfrm flipH="1">
-            <a:off x="5353856" y="2580072"/>
+            <a:off x="5353856" y="2409200"/>
             <a:ext cx="134206" cy="0"/>
           </a:xfrm>
           <a:prstGeom prst="line">
@@ -18865,8 +18865,8 @@
         </p:nvCxnSpPr>
         <p:spPr>
           <a:xfrm flipH="1">
-            <a:off x="2428717" y="3776438"/>
-            <a:ext cx="423907" cy="0"/>
+            <a:off x="2428718" y="3776438"/>
+            <a:ext cx="312396" cy="0"/>
           </a:xfrm>
           <a:prstGeom prst="line">
             <a:avLst/>
@@ -18904,8 +18904,8 @@
         </p:nvCxnSpPr>
         <p:spPr>
           <a:xfrm flipH="1">
-            <a:off x="2852624" y="4658782"/>
-            <a:ext cx="267390" cy="0"/>
+            <a:off x="2741114" y="4573816"/>
+            <a:ext cx="378900" cy="0"/>
           </a:xfrm>
           <a:prstGeom prst="line">
             <a:avLst/>
@@ -18943,8 +18943,8 @@
         </p:nvCxnSpPr>
         <p:spPr>
           <a:xfrm>
-            <a:off x="2852624" y="3776438"/>
-            <a:ext cx="0" cy="882344"/>
+            <a:off x="2741114" y="3776438"/>
+            <a:ext cx="0" cy="797378"/>
           </a:xfrm>
           <a:prstGeom prst="line">
             <a:avLst/>
@@ -18982,8 +18982,8 @@
         </p:nvCxnSpPr>
         <p:spPr>
           <a:xfrm flipV="1">
-            <a:off x="4219116" y="4207206"/>
-            <a:ext cx="1" cy="217620"/>
+            <a:off x="4219117" y="4207206"/>
+            <a:ext cx="0" cy="138789"/>
           </a:xfrm>
           <a:prstGeom prst="line">
             <a:avLst/>
@@ -19021,7 +19021,7 @@
         </p:nvCxnSpPr>
         <p:spPr>
           <a:xfrm flipH="1">
-            <a:off x="4054537" y="4424826"/>
+            <a:off x="4054537" y="4345996"/>
             <a:ext cx="159325" cy="0"/>
           </a:xfrm>
           <a:prstGeom prst="line">
@@ -19133,14 +19133,13 @@
           </p:cNvPr>
           <p:cNvCxnSpPr>
             <a:cxnSpLocks/>
-            <a:stCxn id="9" idx="1"/>
           </p:cNvCxnSpPr>
           <p:nvPr/>
         </p:nvCxnSpPr>
         <p:spPr>
           <a:xfrm flipH="1">
-            <a:off x="1299278" y="2583161"/>
-            <a:ext cx="114299" cy="1428"/>
+            <a:off x="1299279" y="2580072"/>
+            <a:ext cx="499041" cy="4517"/>
           </a:xfrm>
           <a:prstGeom prst="line">
             <a:avLst/>
@@ -19215,8 +19214,8 @@
         </p:nvSpPr>
         <p:spPr>
           <a:xfrm>
-            <a:off x="206837" y="1482032"/>
-            <a:ext cx="759425" cy="338554"/>
+            <a:off x="91294" y="4387503"/>
+            <a:ext cx="1073002" cy="500137"/>
           </a:xfrm>
           <a:prstGeom prst="rect">
             <a:avLst/>
@@ -19229,6 +19228,7 @@
           </a:bodyPr>
           <a:lstStyle/>
           <a:p>
+            <a:pPr algn="ctr"/>
             <a:r>
               <a:rPr lang="en-US" sz="1600" b="1" dirty="0">
                 <a:solidFill>
@@ -19236,6 +19236,17 @@
                 </a:solidFill>
               </a:rPr>
               <a:t>Admin</a:t>
+            </a:r>
+          </a:p>
+          <a:p>
+            <a:pPr algn="ctr"/>
+            <a:r>
+              <a:rPr lang="en-US" sz="1050" b="1" dirty="0">
+                <a:solidFill>
+                  <a:srgbClr val="FF0000"/>
+                </a:solidFill>
+              </a:rPr>
+              <a:t>Calliope Data</a:t>
             </a:r>
           </a:p>
         </p:txBody>
@@ -19252,11 +19263,17 @@
           <p:cNvGraphicFramePr>
             <a:graphicFrameLocks noGrp="1"/>
           </p:cNvGraphicFramePr>
-          <p:nvPr/>
+          <p:nvPr>
+            <p:extLst>
+              <p:ext uri="{D42A27DB-BD31-4B8C-83A1-F6EECF244321}">
+                <p14:modId xmlns:p14="http://schemas.microsoft.com/office/powerpoint/2010/main" val="2491488820"/>
+              </p:ext>
+            </p:extLst>
+          </p:nvPr>
         </p:nvGraphicFramePr>
         <p:xfrm>
           <a:off x="3103825" y="115552"/>
-          <a:ext cx="1043140" cy="1143000"/>
+          <a:ext cx="1043140" cy="1112520"/>
         </p:xfrm>
         <a:graphic>
           <a:graphicData uri="http://schemas.openxmlformats.org/drawingml/2006/table">
@@ -19281,7 +19298,7 @@
                     <a:p>
                       <a:r>
                         <a:rPr lang="en-US" sz="900" dirty="0"/>
-                        <a:t>technology</a:t>
+                        <a:t>Technology</a:t>
                       </a:r>
                     </a:p>
                   </a:txBody>
@@ -19360,8 +19377,8 @@
                     <a:lstStyle/>
                     <a:p>
                       <a:r>
-                        <a:rPr lang="en-US" sz="900" dirty="0"/>
-                        <a:t>pretty_name</a:t>
+                        <a:rPr lang="en-US" sz="700" dirty="0"/>
+                        <a:t>**attributes</a:t>
                       </a:r>
                     </a:p>
                   </a:txBody>
@@ -19389,11 +19406,17 @@
           <p:cNvGraphicFramePr>
             <a:graphicFrameLocks noGrp="1"/>
           </p:cNvGraphicFramePr>
-          <p:nvPr/>
+          <p:nvPr>
+            <p:extLst>
+              <p:ext uri="{D42A27DB-BD31-4B8C-83A1-F6EECF244321}">
+                <p14:modId xmlns:p14="http://schemas.microsoft.com/office/powerpoint/2010/main" val="3290421659"/>
+              </p:ext>
+            </p:extLst>
+          </p:nvPr>
         </p:nvGraphicFramePr>
         <p:xfrm>
-          <a:off x="5709434" y="115552"/>
-          <a:ext cx="953196" cy="1371600"/>
+          <a:off x="5857196" y="115552"/>
+          <a:ext cx="953196" cy="1569720"/>
         </p:xfrm>
         <a:graphic>
           <a:graphicData uri="http://schemas.openxmlformats.org/drawingml/2006/table">
@@ -19530,6 +19553,26 @@
                   </a:ext>
                 </a:extLst>
               </a:tr>
+              <a:tr h="141461">
+                <a:tc>
+                  <a:txBody>
+                    <a:bodyPr/>
+                    <a:lstStyle/>
+                    <a:p>
+                      <a:r>
+                        <a:rPr lang="en-US" sz="700" dirty="0"/>
+                        <a:t>**attributes</a:t>
+                      </a:r>
+                    </a:p>
+                  </a:txBody>
+                  <a:tcPr/>
+                </a:tc>
+                <a:extLst>
+                  <a:ext uri="{0D108BD9-81ED-4DB2-BD59-A6C34878D82A}">
+                    <a16:rowId xmlns:a16="http://schemas.microsoft.com/office/drawing/2014/main" val="4107470130"/>
+                  </a:ext>
+                </a:extLst>
+              </a:tr>
             </a:tbl>
           </a:graphicData>
         </a:graphic>
@@ -19546,11 +19589,17 @@
           <p:cNvGraphicFramePr>
             <a:graphicFrameLocks noGrp="1"/>
           </p:cNvGraphicFramePr>
-          <p:nvPr/>
+          <p:nvPr>
+            <p:extLst>
+              <p:ext uri="{D42A27DB-BD31-4B8C-83A1-F6EECF244321}">
+                <p14:modId xmlns:p14="http://schemas.microsoft.com/office/powerpoint/2010/main" val="3771379697"/>
+              </p:ext>
+            </p:extLst>
+          </p:nvPr>
         </p:nvGraphicFramePr>
         <p:xfrm>
           <a:off x="1413578" y="115552"/>
-          <a:ext cx="1332803" cy="1371600"/>
+          <a:ext cx="1332803" cy="1569720"/>
         </p:xfrm>
         <a:graphic>
           <a:graphicData uri="http://schemas.openxmlformats.org/drawingml/2006/table">
@@ -19574,10 +19623,9 @@
                     <a:lstStyle/>
                     <a:p>
                       <a:r>
-                        <a:rPr lang="en-US" sz="900" dirty="0" err="1"/>
-                        <a:t>abstract_tech</a:t>
+                        <a:rPr lang="en-US" sz="900" dirty="0"/>
+                        <a:t>Abstract_Tech</a:t>
                       </a:r>
-                      <a:endParaRPr lang="en-US" sz="900" dirty="0"/>
                     </a:p>
                   </a:txBody>
                   <a:tcPr/>
@@ -19688,6 +19736,43 @@
                   </a:ext>
                 </a:extLst>
               </a:tr>
+              <a:tr h="141461">
+                <a:tc>
+                  <a:txBody>
+                    <a:bodyPr/>
+                    <a:lstStyle/>
+                    <a:p>
+                      <a:pPr marL="0" marR="0" lvl="0" indent="0" algn="l" defTabSz="457200" rtl="0" eaLnBrk="1" fontAlgn="auto" latinLnBrk="0" hangingPunct="1">
+                        <a:lnSpc>
+                          <a:spcPct val="100000"/>
+                        </a:lnSpc>
+                        <a:spcBef>
+                          <a:spcPts val="0"/>
+                        </a:spcBef>
+                        <a:spcAft>
+                          <a:spcPts val="0"/>
+                        </a:spcAft>
+                        <a:buClrTx/>
+                        <a:buSzTx/>
+                        <a:buFontTx/>
+                        <a:buNone/>
+                        <a:tabLst/>
+                        <a:defRPr/>
+                      </a:pPr>
+                      <a:r>
+                        <a:rPr lang="en-US" sz="700" dirty="0"/>
+                        <a:t>**attributes</a:t>
+                      </a:r>
+                    </a:p>
+                  </a:txBody>
+                  <a:tcPr/>
+                </a:tc>
+                <a:extLst>
+                  <a:ext uri="{0D108BD9-81ED-4DB2-BD59-A6C34878D82A}">
+                    <a16:rowId xmlns:a16="http://schemas.microsoft.com/office/drawing/2014/main" val="1246492808"/>
+                  </a:ext>
+                </a:extLst>
+              </a:tr>
             </a:tbl>
           </a:graphicData>
         </a:graphic>
@@ -19704,11 +19789,17 @@
           <p:cNvGraphicFramePr>
             <a:graphicFrameLocks noGrp="1"/>
           </p:cNvGraphicFramePr>
-          <p:nvPr/>
+          <p:nvPr>
+            <p:extLst>
+              <p:ext uri="{D42A27DB-BD31-4B8C-83A1-F6EECF244321}">
+                <p14:modId xmlns:p14="http://schemas.microsoft.com/office/powerpoint/2010/main" val="1126883281"/>
+              </p:ext>
+            </p:extLst>
+          </p:nvPr>
         </p:nvGraphicFramePr>
         <p:xfrm>
           <a:off x="52040" y="2006005"/>
-          <a:ext cx="1118117" cy="2057400"/>
+          <a:ext cx="1118117" cy="2255520"/>
         </p:xfrm>
         <a:graphic>
           <a:graphicData uri="http://schemas.openxmlformats.org/drawingml/2006/table">
@@ -19733,7 +19824,7 @@
                     <a:p>
                       <a:r>
                         <a:rPr lang="en-US" sz="900" dirty="0"/>
-                        <a:t>parameter</a:t>
+                        <a:t>Parameter</a:t>
                       </a:r>
                     </a:p>
                   </a:txBody>
@@ -19905,6 +19996,43 @@
                   </a:ext>
                 </a:extLst>
               </a:tr>
+              <a:tr h="141461">
+                <a:tc>
+                  <a:txBody>
+                    <a:bodyPr/>
+                    <a:lstStyle/>
+                    <a:p>
+                      <a:pPr marL="0" marR="0" lvl="0" indent="0" algn="l" defTabSz="457200" rtl="0" eaLnBrk="1" fontAlgn="auto" latinLnBrk="0" hangingPunct="1">
+                        <a:lnSpc>
+                          <a:spcPct val="100000"/>
+                        </a:lnSpc>
+                        <a:spcBef>
+                          <a:spcPts val="0"/>
+                        </a:spcBef>
+                        <a:spcAft>
+                          <a:spcPts val="0"/>
+                        </a:spcAft>
+                        <a:buClrTx/>
+                        <a:buSzTx/>
+                        <a:buFontTx/>
+                        <a:buNone/>
+                        <a:tabLst/>
+                        <a:defRPr/>
+                      </a:pPr>
+                      <a:r>
+                        <a:rPr lang="en-US" sz="700" dirty="0"/>
+                        <a:t>**attributes</a:t>
+                      </a:r>
+                    </a:p>
+                  </a:txBody>
+                  <a:tcPr/>
+                </a:tc>
+                <a:extLst>
+                  <a:ext uri="{0D108BD9-81ED-4DB2-BD59-A6C34878D82A}">
+                    <a16:rowId xmlns:a16="http://schemas.microsoft.com/office/drawing/2014/main" val="791418564"/>
+                  </a:ext>
+                </a:extLst>
+              </a:tr>
             </a:tbl>
           </a:graphicData>
         </a:graphic>
@@ -19921,11 +20049,17 @@
           <p:cNvGraphicFramePr>
             <a:graphicFrameLocks noGrp="1"/>
           </p:cNvGraphicFramePr>
-          <p:nvPr/>
+          <p:nvPr>
+            <p:extLst>
+              <p:ext uri="{D42A27DB-BD31-4B8C-83A1-F6EECF244321}">
+                <p14:modId xmlns:p14="http://schemas.microsoft.com/office/powerpoint/2010/main" val="1598459358"/>
+              </p:ext>
+            </p:extLst>
+          </p:nvPr>
         </p:nvGraphicFramePr>
         <p:xfrm>
           <a:off x="4378443" y="115552"/>
-          <a:ext cx="991982" cy="1143000"/>
+          <a:ext cx="991982" cy="1341120"/>
         </p:xfrm>
         <a:graphic>
           <a:graphicData uri="http://schemas.openxmlformats.org/drawingml/2006/table">
@@ -19949,10 +20083,9 @@
                     <a:lstStyle/>
                     <a:p>
                       <a:r>
-                        <a:rPr lang="en-US" sz="900" dirty="0" err="1"/>
-                        <a:t>loc_tech</a:t>
+                        <a:rPr lang="en-US" sz="900" dirty="0"/>
+                        <a:t>Loc_Tech</a:t>
                       </a:r>
-                      <a:endParaRPr lang="en-US" sz="900" dirty="0"/>
                     </a:p>
                   </a:txBody>
                   <a:tcPr/>
@@ -19991,7 +20124,7 @@
                     <a:p>
                       <a:r>
                         <a:rPr lang="en-US" sz="900" dirty="0"/>
-                        <a:t>location_id_1</a:t>
+                        <a:t>location_1</a:t>
                       </a:r>
                     </a:p>
                   </a:txBody>
@@ -20011,7 +20144,7 @@
                     <a:p>
                       <a:r>
                         <a:rPr lang="en-US" sz="900" dirty="0"/>
-                        <a:t>location_id_2</a:t>
+                        <a:t>location_2</a:t>
                       </a:r>
                     </a:p>
                   </a:txBody>
@@ -20043,6 +20176,43 @@
                   </a:ext>
                 </a:extLst>
               </a:tr>
+              <a:tr h="141461">
+                <a:tc>
+                  <a:txBody>
+                    <a:bodyPr/>
+                    <a:lstStyle/>
+                    <a:p>
+                      <a:pPr marL="0" marR="0" lvl="0" indent="0" algn="l" defTabSz="457200" rtl="0" eaLnBrk="1" fontAlgn="auto" latinLnBrk="0" hangingPunct="1">
+                        <a:lnSpc>
+                          <a:spcPct val="100000"/>
+                        </a:lnSpc>
+                        <a:spcBef>
+                          <a:spcPts val="0"/>
+                        </a:spcBef>
+                        <a:spcAft>
+                          <a:spcPts val="0"/>
+                        </a:spcAft>
+                        <a:buClrTx/>
+                        <a:buSzTx/>
+                        <a:buFontTx/>
+                        <a:buNone/>
+                        <a:tabLst/>
+                        <a:defRPr/>
+                      </a:pPr>
+                      <a:r>
+                        <a:rPr lang="en-US" sz="700" dirty="0"/>
+                        <a:t>**attributes</a:t>
+                      </a:r>
+                    </a:p>
+                  </a:txBody>
+                  <a:tcPr/>
+                </a:tc>
+                <a:extLst>
+                  <a:ext uri="{0D108BD9-81ED-4DB2-BD59-A6C34878D82A}">
+                    <a16:rowId xmlns:a16="http://schemas.microsoft.com/office/drawing/2014/main" val="485343064"/>
+                  </a:ext>
+                </a:extLst>
+              </a:tr>
             </a:tbl>
           </a:graphicData>
         </a:graphic>
@@ -20059,11 +20229,17 @@
           <p:cNvGraphicFramePr>
             <a:graphicFrameLocks noGrp="1"/>
           </p:cNvGraphicFramePr>
-          <p:nvPr/>
+          <p:nvPr>
+            <p:extLst>
+              <p:ext uri="{D42A27DB-BD31-4B8C-83A1-F6EECF244321}">
+                <p14:modId xmlns:p14="http://schemas.microsoft.com/office/powerpoint/2010/main" val="3823790693"/>
+              </p:ext>
+            </p:extLst>
+          </p:nvPr>
         </p:nvGraphicFramePr>
         <p:xfrm>
           <a:off x="1413577" y="2011661"/>
-          <a:ext cx="1332803" cy="1143000"/>
+          <a:ext cx="1332803" cy="1341120"/>
         </p:xfrm>
         <a:graphic>
           <a:graphicData uri="http://schemas.openxmlformats.org/drawingml/2006/table">
@@ -20087,10 +20263,9 @@
                     <a:lstStyle/>
                     <a:p>
                       <a:r>
-                        <a:rPr lang="en-US" sz="900" dirty="0" err="1"/>
-                        <a:t>abstract_tech_param</a:t>
+                        <a:rPr lang="en-US" sz="900" dirty="0"/>
+                        <a:t>Abstract_Tech_Param</a:t>
                       </a:r>
-                      <a:endParaRPr lang="en-US" sz="900" dirty="0"/>
                     </a:p>
                   </a:txBody>
                   <a:tcPr/>
@@ -20129,7 +20304,7 @@
                     <a:p>
                       <a:r>
                         <a:rPr lang="en-US" sz="900" dirty="0"/>
-                        <a:t>abstract_tech_id</a:t>
+                        <a:t>abstract_tech</a:t>
                       </a:r>
                     </a:p>
                   </a:txBody>
@@ -20149,7 +20324,7 @@
                     <a:p>
                       <a:r>
                         <a:rPr lang="en-US" sz="900" dirty="0"/>
-                        <a:t>parameter_id</a:t>
+                        <a:t>parameter</a:t>
                       </a:r>
                     </a:p>
                   </a:txBody>
@@ -20181,6 +20356,43 @@
                   </a:ext>
                 </a:extLst>
               </a:tr>
+              <a:tr h="141461">
+                <a:tc>
+                  <a:txBody>
+                    <a:bodyPr/>
+                    <a:lstStyle/>
+                    <a:p>
+                      <a:pPr marL="0" marR="0" lvl="0" indent="0" algn="l" defTabSz="457200" rtl="0" eaLnBrk="1" fontAlgn="auto" latinLnBrk="0" hangingPunct="1">
+                        <a:lnSpc>
+                          <a:spcPct val="100000"/>
+                        </a:lnSpc>
+                        <a:spcBef>
+                          <a:spcPts val="0"/>
+                        </a:spcBef>
+                        <a:spcAft>
+                          <a:spcPts val="0"/>
+                        </a:spcAft>
+                        <a:buClrTx/>
+                        <a:buSzTx/>
+                        <a:buFontTx/>
+                        <a:buNone/>
+                        <a:tabLst/>
+                        <a:defRPr/>
+                      </a:pPr>
+                      <a:r>
+                        <a:rPr lang="en-US" sz="700" dirty="0"/>
+                        <a:t>**attributes</a:t>
+                      </a:r>
+                    </a:p>
+                  </a:txBody>
+                  <a:tcPr/>
+                </a:tc>
+                <a:extLst>
+                  <a:ext uri="{0D108BD9-81ED-4DB2-BD59-A6C34878D82A}">
+                    <a16:rowId xmlns:a16="http://schemas.microsoft.com/office/drawing/2014/main" val="2655169739"/>
+                  </a:ext>
+                </a:extLst>
+              </a:tr>
             </a:tbl>
           </a:graphicData>
         </a:graphic>
@@ -20200,14 +20412,14 @@
           <p:nvPr>
             <p:extLst>
               <p:ext uri="{D42A27DB-BD31-4B8C-83A1-F6EECF244321}">
-                <p14:modId xmlns:p14="http://schemas.microsoft.com/office/powerpoint/2010/main" val="2466495288"/>
+                <p14:modId xmlns:p14="http://schemas.microsoft.com/office/powerpoint/2010/main" val="1764441160"/>
               </p:ext>
             </p:extLst>
           </p:nvPr>
         </p:nvGraphicFramePr>
         <p:xfrm>
-          <a:off x="3103825" y="2011661"/>
-          <a:ext cx="955967" cy="1600200"/>
+          <a:off x="3103825" y="1834929"/>
+          <a:ext cx="955967" cy="1798320"/>
         </p:xfrm>
         <a:graphic>
           <a:graphicData uri="http://schemas.openxmlformats.org/drawingml/2006/table">
@@ -20231,10 +20443,9 @@
                     <a:lstStyle/>
                     <a:p>
                       <a:r>
-                        <a:rPr lang="en-US" sz="900" dirty="0" err="1"/>
-                        <a:t>tech_param</a:t>
+                        <a:rPr lang="en-US" sz="900" dirty="0"/>
+                        <a:t>Tech_Param</a:t>
                       </a:r>
-                      <a:endParaRPr lang="en-US" sz="900" dirty="0"/>
                     </a:p>
                   </a:txBody>
                   <a:tcPr/>
@@ -20313,7 +20524,7 @@
                     <a:p>
                       <a:r>
                         <a:rPr lang="en-US" sz="900" dirty="0"/>
-                        <a:t>parameter_id</a:t>
+                        <a:t>parameter</a:t>
                       </a:r>
                     </a:p>
                   </a:txBody>
@@ -20365,6 +20576,26 @@
                   </a:ext>
                 </a:extLst>
               </a:tr>
+              <a:tr h="141461">
+                <a:tc>
+                  <a:txBody>
+                    <a:bodyPr/>
+                    <a:lstStyle/>
+                    <a:p>
+                      <a:r>
+                        <a:rPr lang="en-US" sz="700" dirty="0"/>
+                        <a:t>**attributes</a:t>
+                      </a:r>
+                    </a:p>
+                  </a:txBody>
+                  <a:tcPr/>
+                </a:tc>
+                <a:extLst>
+                  <a:ext uri="{0D108BD9-81ED-4DB2-BD59-A6C34878D82A}">
+                    <a16:rowId xmlns:a16="http://schemas.microsoft.com/office/drawing/2014/main" val="625720249"/>
+                  </a:ext>
+                </a:extLst>
+              </a:tr>
             </a:tbl>
           </a:graphicData>
         </a:graphic>
@@ -20381,11 +20612,17 @@
           <p:cNvGraphicFramePr>
             <a:graphicFrameLocks noGrp="1"/>
           </p:cNvGraphicFramePr>
-          <p:nvPr/>
+          <p:nvPr>
+            <p:extLst>
+              <p:ext uri="{D42A27DB-BD31-4B8C-83A1-F6EECF244321}">
+                <p14:modId xmlns:p14="http://schemas.microsoft.com/office/powerpoint/2010/main" val="1873670667"/>
+              </p:ext>
+            </p:extLst>
+          </p:nvPr>
         </p:nvGraphicFramePr>
         <p:xfrm>
           <a:off x="4378443" y="3855700"/>
-          <a:ext cx="991982" cy="457200"/>
+          <a:ext cx="991982" cy="655320"/>
         </p:xfrm>
         <a:graphic>
           <a:graphicData uri="http://schemas.openxmlformats.org/drawingml/2006/table">
@@ -20410,7 +20647,7 @@
                     <a:p>
                       <a:r>
                         <a:rPr lang="en-US" sz="900" dirty="0"/>
-                        <a:t>scenario</a:t>
+                        <a:t>Scenario</a:t>
                       </a:r>
                     </a:p>
                   </a:txBody>
@@ -20442,6 +20679,43 @@
                   </a:ext>
                 </a:extLst>
               </a:tr>
+              <a:tr h="141461">
+                <a:tc>
+                  <a:txBody>
+                    <a:bodyPr/>
+                    <a:lstStyle/>
+                    <a:p>
+                      <a:pPr marL="0" marR="0" lvl="0" indent="0" algn="l" defTabSz="457200" rtl="0" eaLnBrk="1" fontAlgn="auto" latinLnBrk="0" hangingPunct="1">
+                        <a:lnSpc>
+                          <a:spcPct val="100000"/>
+                        </a:lnSpc>
+                        <a:spcBef>
+                          <a:spcPts val="0"/>
+                        </a:spcBef>
+                        <a:spcAft>
+                          <a:spcPts val="0"/>
+                        </a:spcAft>
+                        <a:buClrTx/>
+                        <a:buSzTx/>
+                        <a:buFontTx/>
+                        <a:buNone/>
+                        <a:tabLst/>
+                        <a:defRPr/>
+                      </a:pPr>
+                      <a:r>
+                        <a:rPr lang="en-US" sz="700" dirty="0"/>
+                        <a:t>**attributes</a:t>
+                      </a:r>
+                    </a:p>
+                  </a:txBody>
+                  <a:tcPr/>
+                </a:tc>
+                <a:extLst>
+                  <a:ext uri="{0D108BD9-81ED-4DB2-BD59-A6C34878D82A}">
+                    <a16:rowId xmlns:a16="http://schemas.microsoft.com/office/drawing/2014/main" val="2513059217"/>
+                  </a:ext>
+                </a:extLst>
+              </a:tr>
             </a:tbl>
           </a:graphicData>
         </a:graphic>
@@ -20458,11 +20732,17 @@
           <p:cNvGraphicFramePr>
             <a:graphicFrameLocks noGrp="1"/>
           </p:cNvGraphicFramePr>
-          <p:nvPr/>
+          <p:nvPr>
+            <p:extLst>
+              <p:ext uri="{D42A27DB-BD31-4B8C-83A1-F6EECF244321}">
+                <p14:modId xmlns:p14="http://schemas.microsoft.com/office/powerpoint/2010/main" val="3868918454"/>
+              </p:ext>
+            </p:extLst>
+          </p:nvPr>
         </p:nvGraphicFramePr>
         <p:xfrm>
-          <a:off x="3005567" y="3855700"/>
-          <a:ext cx="1054225" cy="1143000"/>
+          <a:off x="3005567" y="3768987"/>
+          <a:ext cx="1054225" cy="1341120"/>
         </p:xfrm>
         <a:graphic>
           <a:graphicData uri="http://schemas.openxmlformats.org/drawingml/2006/table">
@@ -20486,10 +20766,9 @@
                     <a:lstStyle/>
                     <a:p>
                       <a:r>
-                        <a:rPr lang="en-US" sz="900" dirty="0" err="1"/>
-                        <a:t>scenario_param</a:t>
+                        <a:rPr lang="en-US" sz="900" dirty="0"/>
+                        <a:t>Scenario_Param</a:t>
                       </a:r>
-                      <a:endParaRPr lang="en-US" sz="900" dirty="0"/>
                     </a:p>
                   </a:txBody>
                   <a:tcPr/>
@@ -20528,7 +20807,7 @@
                     <a:p>
                       <a:r>
                         <a:rPr lang="en-US" sz="900" dirty="0"/>
-                        <a:t>scenario_id</a:t>
+                        <a:t>scenario</a:t>
                       </a:r>
                     </a:p>
                   </a:txBody>
@@ -20548,7 +20827,7 @@
                     <a:p>
                       <a:r>
                         <a:rPr lang="en-US" sz="900" dirty="0"/>
-                        <a:t>run_parameter_id</a:t>
+                        <a:t>run_parameter</a:t>
                       </a:r>
                     </a:p>
                   </a:txBody>
@@ -20580,6 +20859,43 @@
                   </a:ext>
                 </a:extLst>
               </a:tr>
+              <a:tr h="141461">
+                <a:tc>
+                  <a:txBody>
+                    <a:bodyPr/>
+                    <a:lstStyle/>
+                    <a:p>
+                      <a:pPr marL="0" marR="0" lvl="0" indent="0" algn="l" defTabSz="457200" rtl="0" eaLnBrk="1" fontAlgn="auto" latinLnBrk="0" hangingPunct="1">
+                        <a:lnSpc>
+                          <a:spcPct val="100000"/>
+                        </a:lnSpc>
+                        <a:spcBef>
+                          <a:spcPts val="0"/>
+                        </a:spcBef>
+                        <a:spcAft>
+                          <a:spcPts val="0"/>
+                        </a:spcAft>
+                        <a:buClrTx/>
+                        <a:buSzTx/>
+                        <a:buFontTx/>
+                        <a:buNone/>
+                        <a:tabLst/>
+                        <a:defRPr/>
+                      </a:pPr>
+                      <a:r>
+                        <a:rPr lang="en-US" sz="700" dirty="0"/>
+                        <a:t>**attributes</a:t>
+                      </a:r>
+                    </a:p>
+                  </a:txBody>
+                  <a:tcPr/>
+                </a:tc>
+                <a:extLst>
+                  <a:ext uri="{0D108BD9-81ED-4DB2-BD59-A6C34878D82A}">
+                    <a16:rowId xmlns:a16="http://schemas.microsoft.com/office/drawing/2014/main" val="2749252802"/>
+                  </a:ext>
+                </a:extLst>
+              </a:tr>
             </a:tbl>
           </a:graphicData>
         </a:graphic>
@@ -20596,11 +20912,17 @@
           <p:cNvGraphicFramePr>
             <a:graphicFrameLocks noGrp="1"/>
           </p:cNvGraphicFramePr>
-          <p:nvPr/>
+          <p:nvPr>
+            <p:extLst>
+              <p:ext uri="{D42A27DB-BD31-4B8C-83A1-F6EECF244321}">
+                <p14:modId xmlns:p14="http://schemas.microsoft.com/office/powerpoint/2010/main" val="1068063004"/>
+              </p:ext>
+            </p:extLst>
+          </p:nvPr>
         </p:nvGraphicFramePr>
         <p:xfrm>
           <a:off x="1437416" y="3444593"/>
-          <a:ext cx="989209" cy="1600200"/>
+          <a:ext cx="989209" cy="1569720"/>
         </p:xfrm>
         <a:graphic>
           <a:graphicData uri="http://schemas.openxmlformats.org/drawingml/2006/table">
@@ -20624,10 +20946,9 @@
                     <a:lstStyle/>
                     <a:p>
                       <a:r>
-                        <a:rPr lang="en-US" sz="900" dirty="0" err="1"/>
-                        <a:t>run_parameter</a:t>
+                        <a:rPr lang="en-US" sz="900" dirty="0"/>
+                        <a:t>Run_Parameter</a:t>
                       </a:r>
-                      <a:endParaRPr lang="en-US" sz="900" dirty="0"/>
                     </a:p>
                   </a:txBody>
                   <a:tcPr/>
@@ -20762,8 +21083,8 @@
                     <a:lstStyle/>
                     <a:p>
                       <a:r>
-                        <a:rPr lang="en-US" sz="900" dirty="0"/>
-                        <a:t>description</a:t>
+                        <a:rPr lang="en-US" sz="700" dirty="0"/>
+                        <a:t>**attributes</a:t>
                       </a:r>
                     </a:p>
                   </a:txBody>
@@ -20791,11 +21112,17 @@
           <p:cNvGraphicFramePr>
             <a:graphicFrameLocks noGrp="1"/>
           </p:cNvGraphicFramePr>
-          <p:nvPr/>
+          <p:nvPr>
+            <p:extLst>
+              <p:ext uri="{D42A27DB-BD31-4B8C-83A1-F6EECF244321}">
+                <p14:modId xmlns:p14="http://schemas.microsoft.com/office/powerpoint/2010/main" val="3252549043"/>
+              </p:ext>
+            </p:extLst>
+          </p:nvPr>
         </p:nvGraphicFramePr>
         <p:xfrm>
           <a:off x="5713567" y="3855700"/>
-          <a:ext cx="1045565" cy="914400"/>
+          <a:ext cx="1180727" cy="1112520"/>
         </p:xfrm>
         <a:graphic>
           <a:graphicData uri="http://schemas.openxmlformats.org/drawingml/2006/table">
@@ -20804,7 +21131,7 @@
                 <a:tableStyleId>{5C22544A-7EE6-4342-B048-85BDC9FD1C3A}</a:tableStyleId>
               </a:tblPr>
               <a:tblGrid>
-                <a:gridCol w="1045565">
+                <a:gridCol w="1180727">
                   <a:extLst>
                     <a:ext uri="{9D8B030D-6E8A-4147-A177-3AD203B41FA5}">
                       <a16:colId xmlns:a16="http://schemas.microsoft.com/office/drawing/2014/main" val="1319760997"/>
@@ -20819,10 +21146,9 @@
                     <a:lstStyle/>
                     <a:p>
                       <a:r>
-                        <a:rPr lang="en-US" sz="900" dirty="0" err="1"/>
-                        <a:t>scenario_loc_tech</a:t>
+                        <a:rPr lang="en-US" sz="900" dirty="0"/>
+                        <a:t>Scenario_Loc_Tech</a:t>
                       </a:r>
-                      <a:endParaRPr lang="en-US" sz="900" dirty="0"/>
                     </a:p>
                   </a:txBody>
                   <a:tcPr/>
@@ -20861,7 +21187,7 @@
                     <a:p>
                       <a:r>
                         <a:rPr lang="en-US" sz="900" dirty="0"/>
-                        <a:t>scenario_id</a:t>
+                        <a:t>scenario</a:t>
                       </a:r>
                     </a:p>
                   </a:txBody>
@@ -20881,7 +21207,7 @@
                     <a:p>
                       <a:r>
                         <a:rPr lang="en-US" sz="900" dirty="0"/>
-                        <a:t>loc_tech_id</a:t>
+                        <a:t>loc_tech</a:t>
                       </a:r>
                     </a:p>
                   </a:txBody>
@@ -20893,6 +21219,43 @@
                   </a:ext>
                 </a:extLst>
               </a:tr>
+              <a:tr h="141461">
+                <a:tc>
+                  <a:txBody>
+                    <a:bodyPr/>
+                    <a:lstStyle/>
+                    <a:p>
+                      <a:pPr marL="0" marR="0" lvl="0" indent="0" algn="l" defTabSz="457200" rtl="0" eaLnBrk="1" fontAlgn="auto" latinLnBrk="0" hangingPunct="1">
+                        <a:lnSpc>
+                          <a:spcPct val="100000"/>
+                        </a:lnSpc>
+                        <a:spcBef>
+                          <a:spcPts val="0"/>
+                        </a:spcBef>
+                        <a:spcAft>
+                          <a:spcPts val="0"/>
+                        </a:spcAft>
+                        <a:buClrTx/>
+                        <a:buSzTx/>
+                        <a:buFontTx/>
+                        <a:buNone/>
+                        <a:tabLst/>
+                        <a:defRPr/>
+                      </a:pPr>
+                      <a:r>
+                        <a:rPr lang="en-US" sz="700" dirty="0"/>
+                        <a:t>**attributes</a:t>
+                      </a:r>
+                    </a:p>
+                  </a:txBody>
+                  <a:tcPr/>
+                </a:tc>
+                <a:extLst>
+                  <a:ext uri="{0D108BD9-81ED-4DB2-BD59-A6C34878D82A}">
+                    <a16:rowId xmlns:a16="http://schemas.microsoft.com/office/drawing/2014/main" val="1638191274"/>
+                  </a:ext>
+                </a:extLst>
+              </a:tr>
             </a:tbl>
           </a:graphicData>
         </a:graphic>
@@ -20911,8 +21274,8 @@
         </p:nvSpPr>
         <p:spPr>
           <a:xfrm>
-            <a:off x="64206" y="397011"/>
-            <a:ext cx="985409" cy="707886"/>
+            <a:off x="113890" y="457548"/>
+            <a:ext cx="985409" cy="1029604"/>
           </a:xfrm>
           <a:prstGeom prst="rect">
             <a:avLst/>
@@ -20955,8 +21318,8 @@
         </p:nvSpPr>
         <p:spPr>
           <a:xfrm>
-            <a:off x="23113" y="397012"/>
-            <a:ext cx="1072055" cy="707886"/>
+            <a:off x="94398" y="516481"/>
+            <a:ext cx="1072055" cy="923330"/>
           </a:xfrm>
           <a:prstGeom prst="rect">
             <a:avLst/>
@@ -20972,7 +21335,7 @@
             <a:pPr algn="ctr"/>
             <a:r>
               <a:rPr lang="en-US" sz="2000" dirty="0"/>
-              <a:t>Inputs</a:t>
+              <a:t>Config</a:t>
             </a:r>
           </a:p>
           <a:p>
@@ -20980,6 +21343,13 @@
             <a:r>
               <a:rPr lang="en-US" sz="2000" dirty="0"/>
               <a:t>Schema</a:t>
+            </a:r>
+          </a:p>
+          <a:p>
+            <a:pPr algn="ctr"/>
+            <a:r>
+              <a:rPr lang="en-US" sz="1400" dirty="0"/>
+              <a:t>(Simplified)</a:t>
             </a:r>
           </a:p>
         </p:txBody>
@@ -20998,8 +21368,8 @@
         </p:nvSpPr>
         <p:spPr>
           <a:xfrm>
-            <a:off x="3485090" y="1266460"/>
-            <a:ext cx="457605" cy="461665"/>
+            <a:off x="2994994" y="1219790"/>
+            <a:ext cx="1167166" cy="623248"/>
           </a:xfrm>
           <a:prstGeom prst="rect">
             <a:avLst/>
@@ -21012,10 +21382,20 @@
           </a:bodyPr>
           <a:lstStyle/>
           <a:p>
+            <a:pPr algn="ctr"/>
             <a:r>
               <a:rPr lang="en-US" sz="2400" b="1" dirty="0"/>
               <a:t>2</a:t>
             </a:r>
+            <a:endParaRPr lang="en-US" sz="1050" b="1" dirty="0"/>
+          </a:p>
+          <a:p>
+            <a:pPr algn="ctr"/>
+            <a:r>
+              <a:rPr lang="en-US" sz="1050" b="1" dirty="0"/>
+              <a:t>Technologies</a:t>
+            </a:r>
+            <a:endParaRPr lang="en-US" sz="1000" b="1" dirty="0"/>
           </a:p>
         </p:txBody>
       </p:sp>
@@ -21033,8 +21413,8 @@
         </p:nvSpPr>
         <p:spPr>
           <a:xfrm>
-            <a:off x="4747304" y="1306334"/>
-            <a:ext cx="457605" cy="461665"/>
+            <a:off x="6908542" y="2284695"/>
+            <a:ext cx="625635" cy="623248"/>
           </a:xfrm>
           <a:prstGeom prst="rect">
             <a:avLst/>
@@ -21047,9 +21427,17 @@
           </a:bodyPr>
           <a:lstStyle/>
           <a:p>
+            <a:pPr algn="ctr"/>
             <a:r>
               <a:rPr lang="en-US" sz="2400" b="1" dirty="0"/>
               <a:t>3</a:t>
+            </a:r>
+          </a:p>
+          <a:p>
+            <a:pPr algn="ctr"/>
+            <a:r>
+              <a:rPr lang="en-US" sz="1050" b="1" dirty="0"/>
+              <a:t>Nodes</a:t>
             </a:r>
           </a:p>
         </p:txBody>
@@ -21068,8 +21456,8 @@
         </p:nvSpPr>
         <p:spPr>
           <a:xfrm>
-            <a:off x="4694196" y="4495028"/>
-            <a:ext cx="457605" cy="461665"/>
+            <a:off x="4483490" y="4498582"/>
+            <a:ext cx="768702" cy="623248"/>
           </a:xfrm>
           <a:prstGeom prst="rect">
             <a:avLst/>
@@ -21082,9 +21470,17 @@
           </a:bodyPr>
           <a:lstStyle/>
           <a:p>
+            <a:pPr algn="ctr"/>
             <a:r>
               <a:rPr lang="en-US" sz="2400" b="1" dirty="0"/>
               <a:t>4</a:t>
+            </a:r>
+          </a:p>
+          <a:p>
+            <a:pPr algn="ctr"/>
+            <a:r>
+              <a:rPr lang="en-US" sz="1050" b="1" dirty="0"/>
+              <a:t>Scenarios</a:t>
             </a:r>
           </a:p>
         </p:txBody>
@@ -21103,8 +21499,8 @@
         </p:nvSpPr>
         <p:spPr>
           <a:xfrm>
-            <a:off x="7207724" y="90476"/>
-            <a:ext cx="457605" cy="461665"/>
+            <a:off x="7445114" y="1265795"/>
+            <a:ext cx="457605" cy="623248"/>
           </a:xfrm>
           <a:prstGeom prst="rect">
             <a:avLst/>
@@ -21117,9 +21513,17 @@
           </a:bodyPr>
           <a:lstStyle/>
           <a:p>
+            <a:pPr algn="ctr"/>
             <a:r>
               <a:rPr lang="en-US" sz="2400" b="1" dirty="0"/>
               <a:t>5</a:t>
+            </a:r>
+          </a:p>
+          <a:p>
+            <a:pPr algn="ctr"/>
+            <a:r>
+              <a:rPr lang="en-US" sz="1050" b="1" dirty="0"/>
+              <a:t>Runs</a:t>
             </a:r>
           </a:p>
         </p:txBody>
@@ -21136,11 +21540,17 @@
           <p:cNvGraphicFramePr>
             <a:graphicFrameLocks noGrp="1"/>
           </p:cNvGraphicFramePr>
-          <p:nvPr/>
+          <p:nvPr>
+            <p:extLst>
+              <p:ext uri="{D42A27DB-BD31-4B8C-83A1-F6EECF244321}">
+                <p14:modId xmlns:p14="http://schemas.microsoft.com/office/powerpoint/2010/main" val="4238666316"/>
+              </p:ext>
+            </p:extLst>
+          </p:nvPr>
         </p:nvGraphicFramePr>
         <p:xfrm>
           <a:off x="8023006" y="3841332"/>
-          <a:ext cx="1043140" cy="914400"/>
+          <a:ext cx="1043140" cy="883920"/>
         </p:xfrm>
         <a:graphic>
           <a:graphicData uri="http://schemas.openxmlformats.org/drawingml/2006/table">
@@ -21165,7 +21575,7 @@
                     <a:p>
                       <a:r>
                         <a:rPr lang="en-US" sz="900" dirty="0"/>
-                        <a:t>model</a:t>
+                        <a:t>Model</a:t>
                       </a:r>
                     </a:p>
                   </a:txBody>
@@ -21185,7 +21595,7 @@
                     <a:p>
                       <a:r>
                         <a:rPr lang="en-US" sz="900" dirty="0"/>
-                        <a:t>id</a:t>
+                        <a:t>uuid</a:t>
                       </a:r>
                     </a:p>
                   </a:txBody>
@@ -21224,8 +21634,8 @@
                     <a:lstStyle/>
                     <a:p>
                       <a:r>
-                        <a:rPr lang="en-US" sz="900" dirty="0"/>
-                        <a:t>settings….</a:t>
+                        <a:rPr lang="en-US" sz="700" dirty="0"/>
+                        <a:t>**attributes</a:t>
                       </a:r>
                     </a:p>
                   </a:txBody>
@@ -21255,8 +21665,8 @@
         </p:nvSpPr>
         <p:spPr>
           <a:xfrm>
-            <a:off x="6866685" y="3739528"/>
-            <a:ext cx="457605" cy="461665"/>
+            <a:off x="6937080" y="4359400"/>
+            <a:ext cx="1043140" cy="646331"/>
           </a:xfrm>
           <a:prstGeom prst="rect">
             <a:avLst/>
@@ -21269,10 +21679,19 @@
           </a:bodyPr>
           <a:lstStyle/>
           <a:p>
+            <a:pPr algn="ctr"/>
             <a:r>
               <a:rPr lang="en-US" sz="2400" b="1" dirty="0"/>
               <a:t>0</a:t>
             </a:r>
+          </a:p>
+          <a:p>
+            <a:pPr algn="ctr"/>
+            <a:r>
+              <a:rPr lang="en-US" sz="1050" b="1" dirty="0"/>
+              <a:t>Models</a:t>
+            </a:r>
+            <a:endParaRPr lang="en-US" sz="2400" b="1" dirty="0"/>
           </a:p>
         </p:txBody>
       </p:sp>
@@ -21298,7 +21717,9 @@
           <a:prstGeom prst="line">
             <a:avLst/>
           </a:prstGeom>
-          <a:ln w="12700"/>
+          <a:ln w="12700">
+            <a:tailEnd type="triangle"/>
+          </a:ln>
         </p:spPr>
         <p:style>
           <a:lnRef idx="2">
@@ -21329,7 +21750,7 @@
         </p:nvSpPr>
         <p:spPr>
           <a:xfrm>
-            <a:off x="7078322" y="3793676"/>
+            <a:off x="7018653" y="3764665"/>
             <a:ext cx="1031047" cy="430887"/>
           </a:xfrm>
           <a:prstGeom prst="rect">
@@ -21345,108 +21766,11 @@
           <a:p>
             <a:r>
               <a:rPr lang="en-US" sz="1050" dirty="0"/>
-              <a:t>model_id on all user tables</a:t>
-            </a:r>
-          </a:p>
-        </p:txBody>
-      </p:sp>
-      <p:graphicFrame>
-        <p:nvGraphicFramePr>
-          <p:cNvPr id="93" name="Table 92">
-            <a:extLst>
-              <a:ext uri="{FF2B5EF4-FFF2-40B4-BE49-F238E27FC236}">
-                <a16:creationId xmlns:a16="http://schemas.microsoft.com/office/drawing/2014/main" id="{BECA7EFC-1CA7-3645-B4BF-026621A04B49}"/>
-              </a:ext>
-            </a:extLst>
-          </p:cNvPr>
-          <p:cNvGraphicFramePr>
-            <a:graphicFrameLocks noGrp="1"/>
-          </p:cNvGraphicFramePr>
-          <p:nvPr/>
-        </p:nvGraphicFramePr>
-        <p:xfrm>
-          <a:off x="6926791" y="4412832"/>
-          <a:ext cx="1043140" cy="685800"/>
-        </p:xfrm>
-        <a:graphic>
-          <a:graphicData uri="http://schemas.openxmlformats.org/drawingml/2006/table">
-            <a:tbl>
-              <a:tblPr firstRow="1" bandRow="1">
-                <a:tableStyleId>{5C22544A-7EE6-4342-B048-85BDC9FD1C3A}</a:tableStyleId>
-              </a:tblPr>
-              <a:tblGrid>
-                <a:gridCol w="1043140">
-                  <a:extLst>
-                    <a:ext uri="{9D8B030D-6E8A-4147-A177-3AD203B41FA5}">
-                      <a16:colId xmlns:a16="http://schemas.microsoft.com/office/drawing/2014/main" val="1319760997"/>
-                    </a:ext>
-                  </a:extLst>
-                </a:gridCol>
-              </a:tblGrid>
-              <a:tr h="141461">
-                <a:tc>
-                  <a:txBody>
-                    <a:bodyPr/>
-                    <a:lstStyle/>
-                    <a:p>
-                      <a:r>
-                        <a:rPr lang="en-US" sz="900" dirty="0"/>
-                        <a:t>carrier</a:t>
-                      </a:r>
-                    </a:p>
-                  </a:txBody>
-                  <a:tcPr/>
-                </a:tc>
-                <a:extLst>
-                  <a:ext uri="{0D108BD9-81ED-4DB2-BD59-A6C34878D82A}">
-                    <a16:rowId xmlns:a16="http://schemas.microsoft.com/office/drawing/2014/main" val="4111631109"/>
-                  </a:ext>
-                </a:extLst>
-              </a:tr>
-              <a:tr h="141461">
-                <a:tc>
-                  <a:txBody>
-                    <a:bodyPr/>
-                    <a:lstStyle/>
-                    <a:p>
-                      <a:r>
-                        <a:rPr lang="en-US" sz="900" dirty="0"/>
-                        <a:t>id</a:t>
-                      </a:r>
-                    </a:p>
-                  </a:txBody>
-                  <a:tcPr/>
-                </a:tc>
-                <a:extLst>
-                  <a:ext uri="{0D108BD9-81ED-4DB2-BD59-A6C34878D82A}">
-                    <a16:rowId xmlns:a16="http://schemas.microsoft.com/office/drawing/2014/main" val="2759364769"/>
-                  </a:ext>
-                </a:extLst>
-              </a:tr>
-              <a:tr h="141461">
-                <a:tc>
-                  <a:txBody>
-                    <a:bodyPr/>
-                    <a:lstStyle/>
-                    <a:p>
-                      <a:r>
-                        <a:rPr lang="en-US" sz="900" dirty="0"/>
-                        <a:t>name</a:t>
-                      </a:r>
-                    </a:p>
-                  </a:txBody>
-                  <a:tcPr/>
-                </a:tc>
-                <a:extLst>
-                  <a:ext uri="{0D108BD9-81ED-4DB2-BD59-A6C34878D82A}">
-                    <a16:rowId xmlns:a16="http://schemas.microsoft.com/office/drawing/2014/main" val="695365453"/>
-                  </a:ext>
-                </a:extLst>
-              </a:tr>
-            </a:tbl>
-          </a:graphicData>
-        </a:graphic>
-      </p:graphicFrame>
+              <a:t>model_uuid on all user tables</a:t>
+            </a:r>
+          </a:p>
+        </p:txBody>
+      </p:sp>
       <p:graphicFrame>
         <p:nvGraphicFramePr>
           <p:cNvPr id="94" name="Table 93">
@@ -21459,7 +21783,13 @@
           <p:cNvGraphicFramePr>
             <a:graphicFrameLocks noGrp="1"/>
           </p:cNvGraphicFramePr>
-          <p:nvPr/>
+          <p:nvPr>
+            <p:extLst>
+              <p:ext uri="{D42A27DB-BD31-4B8C-83A1-F6EECF244321}">
+                <p14:modId xmlns:p14="http://schemas.microsoft.com/office/powerpoint/2010/main" val="1429575654"/>
+              </p:ext>
+            </p:extLst>
+          </p:nvPr>
         </p:nvGraphicFramePr>
         <p:xfrm>
           <a:off x="7893377" y="52819"/>
@@ -21528,7 +21858,7 @@
                     <a:p>
                       <a:r>
                         <a:rPr lang="en-US" sz="900" dirty="0"/>
-                        <a:t>model_id</a:t>
+                        <a:t>model</a:t>
                       </a:r>
                     </a:p>
                   </a:txBody>
@@ -21548,7 +21878,7 @@
                     <a:p>
                       <a:r>
                         <a:rPr lang="en-US" sz="900" dirty="0"/>
-                        <a:t>scenario_id</a:t>
+                        <a:t>scenario</a:t>
                       </a:r>
                     </a:p>
                   </a:txBody>
@@ -21720,7 +22050,7 @@
         </p:nvCxnSpPr>
         <p:spPr>
           <a:xfrm flipV="1">
-            <a:off x="5633006" y="454503"/>
+            <a:off x="5706691" y="455215"/>
             <a:ext cx="0" cy="460305"/>
           </a:xfrm>
           <a:prstGeom prst="line">
@@ -21765,7 +22095,10 @@
           <a:prstGeom prst="line">
             <a:avLst/>
           </a:prstGeom>
-          <a:ln w="12700"/>
+          <a:ln w="12700">
+            <a:headEnd type="none" w="med" len="med"/>
+            <a:tailEnd type="triangle"/>
+          </a:ln>
         </p:spPr>
         <p:style>
           <a:lnRef idx="2">
@@ -21804,7 +22137,9 @@
           <a:prstGeom prst="line">
             <a:avLst/>
           </a:prstGeom>
-          <a:ln w="12700"/>
+          <a:ln w="12700">
+            <a:tailEnd type="triangle"/>
+          </a:ln>
         </p:spPr>
         <p:style>
           <a:lnRef idx="2">
@@ -21835,7 +22170,7 @@
         </p:nvSpPr>
         <p:spPr>
           <a:xfrm>
-            <a:off x="7574681" y="2804992"/>
+            <a:off x="7902719" y="2806555"/>
             <a:ext cx="985409" cy="707886"/>
           </a:xfrm>
           <a:prstGeom prst="rect">
@@ -21879,7 +22214,7 @@
         </p:nvSpPr>
         <p:spPr>
           <a:xfrm>
-            <a:off x="7527526" y="2796818"/>
+            <a:off x="7853845" y="2811761"/>
             <a:ext cx="1072055" cy="707886"/>
           </a:xfrm>
           <a:prstGeom prst="rect">
@@ -21922,8 +22257,8 @@
         </p:nvSpPr>
         <p:spPr>
           <a:xfrm>
-            <a:off x="6653763" y="73142"/>
-            <a:ext cx="457605" cy="461665"/>
+            <a:off x="6810392" y="492256"/>
+            <a:ext cx="710535" cy="623248"/>
           </a:xfrm>
           <a:prstGeom prst="rect">
             <a:avLst/>
@@ -21936,273 +22271,22 @@
           </a:bodyPr>
           <a:lstStyle/>
           <a:p>
+            <a:pPr algn="ctr"/>
             <a:r>
               <a:rPr lang="en-US" sz="2400" b="1" dirty="0"/>
               <a:t>1</a:t>
             </a:r>
           </a:p>
-        </p:txBody>
-      </p:sp>
-      <p:cxnSp>
-        <p:nvCxnSpPr>
-          <p:cNvPr id="103" name="Straight Connector 102">
-            <a:extLst>
-              <a:ext uri="{FF2B5EF4-FFF2-40B4-BE49-F238E27FC236}">
-                <a16:creationId xmlns:a16="http://schemas.microsoft.com/office/drawing/2014/main" id="{69A1A397-B04F-8C47-AFAA-8C36E0078F1F}"/>
-              </a:ext>
-            </a:extLst>
-          </p:cNvPr>
-          <p:cNvCxnSpPr>
-            <a:cxnSpLocks/>
-          </p:cNvCxnSpPr>
-          <p:nvPr/>
-        </p:nvCxnSpPr>
-        <p:spPr>
-          <a:xfrm flipH="1" flipV="1">
-            <a:off x="7177493" y="2148471"/>
-            <a:ext cx="9489" cy="959002"/>
-          </a:xfrm>
-          <a:prstGeom prst="line">
-            <a:avLst/>
-          </a:prstGeom>
-          <a:ln w="12700"/>
-        </p:spPr>
-        <p:style>
-          <a:lnRef idx="2">
-            <a:schemeClr val="accent1"/>
-          </a:lnRef>
-          <a:fillRef idx="0">
-            <a:schemeClr val="accent1"/>
-          </a:fillRef>
-          <a:effectRef idx="1">
-            <a:schemeClr val="accent1"/>
-          </a:effectRef>
-          <a:fontRef idx="minor">
-            <a:schemeClr val="tx1"/>
-          </a:fontRef>
-        </p:style>
-      </p:cxnSp>
-      <p:cxnSp>
-        <p:nvCxnSpPr>
-          <p:cNvPr id="105" name="Straight Connector 104">
-            <a:extLst>
-              <a:ext uri="{FF2B5EF4-FFF2-40B4-BE49-F238E27FC236}">
-                <a16:creationId xmlns:a16="http://schemas.microsoft.com/office/drawing/2014/main" id="{41A615F7-786E-DF42-A904-F28D5613F603}"/>
-              </a:ext>
-            </a:extLst>
-          </p:cNvPr>
-          <p:cNvCxnSpPr>
-            <a:cxnSpLocks/>
-          </p:cNvCxnSpPr>
-          <p:nvPr/>
-        </p:nvCxnSpPr>
-        <p:spPr>
-          <a:xfrm flipH="1">
-            <a:off x="6898917" y="2148471"/>
-            <a:ext cx="278576" cy="0"/>
-          </a:xfrm>
-          <a:prstGeom prst="line">
-            <a:avLst/>
-          </a:prstGeom>
-          <a:ln w="12700"/>
-        </p:spPr>
-        <p:style>
-          <a:lnRef idx="2">
-            <a:schemeClr val="accent1"/>
-          </a:lnRef>
-          <a:fillRef idx="0">
-            <a:schemeClr val="accent1"/>
-          </a:fillRef>
-          <a:effectRef idx="1">
-            <a:schemeClr val="accent1"/>
-          </a:effectRef>
-          <a:fontRef idx="minor">
-            <a:schemeClr val="tx1"/>
-          </a:fontRef>
-        </p:style>
-      </p:cxnSp>
-      <p:cxnSp>
-        <p:nvCxnSpPr>
-          <p:cNvPr id="106" name="Straight Connector 105">
-            <a:extLst>
-              <a:ext uri="{FF2B5EF4-FFF2-40B4-BE49-F238E27FC236}">
-                <a16:creationId xmlns:a16="http://schemas.microsoft.com/office/drawing/2014/main" id="{10E3B37E-C283-4348-A151-251766B68125}"/>
-              </a:ext>
-            </a:extLst>
-          </p:cNvPr>
-          <p:cNvCxnSpPr>
-            <a:cxnSpLocks/>
-          </p:cNvCxnSpPr>
-          <p:nvPr/>
-        </p:nvCxnSpPr>
-        <p:spPr>
-          <a:xfrm flipH="1">
-            <a:off x="6898917" y="3103759"/>
-            <a:ext cx="288065" cy="0"/>
-          </a:xfrm>
-          <a:prstGeom prst="line">
-            <a:avLst/>
-          </a:prstGeom>
-          <a:ln w="12700"/>
-        </p:spPr>
-        <p:style>
-          <a:lnRef idx="2">
-            <a:schemeClr val="accent1"/>
-          </a:lnRef>
-          <a:fillRef idx="0">
-            <a:schemeClr val="accent1"/>
-          </a:fillRef>
-          <a:effectRef idx="1">
-            <a:schemeClr val="accent1"/>
-          </a:effectRef>
-          <a:fontRef idx="minor">
-            <a:schemeClr val="tx1"/>
-          </a:fontRef>
-        </p:style>
-      </p:cxnSp>
-      <p:graphicFrame>
-        <p:nvGraphicFramePr>
-          <p:cNvPr id="315" name="Table 314">
-            <a:extLst>
-              <a:ext uri="{FF2B5EF4-FFF2-40B4-BE49-F238E27FC236}">
-                <a16:creationId xmlns:a16="http://schemas.microsoft.com/office/drawing/2014/main" id="{B7BAA71E-927F-AC48-A330-6E55A1D67EAE}"/>
-              </a:ext>
-            </a:extLst>
-          </p:cNvPr>
-          <p:cNvGraphicFramePr>
-            <a:graphicFrameLocks noGrp="1"/>
-          </p:cNvGraphicFramePr>
-          <p:nvPr>
-            <p:extLst>
-              <p:ext uri="{D42A27DB-BD31-4B8C-83A1-F6EECF244321}">
-                <p14:modId xmlns:p14="http://schemas.microsoft.com/office/powerpoint/2010/main" val="1973579380"/>
-              </p:ext>
-            </p:extLst>
-          </p:nvPr>
-        </p:nvGraphicFramePr>
-        <p:xfrm>
-          <a:off x="5849966" y="2549048"/>
-          <a:ext cx="1050413" cy="1143000"/>
-        </p:xfrm>
-        <a:graphic>
-          <a:graphicData uri="http://schemas.openxmlformats.org/drawingml/2006/table">
-            <a:tbl>
-              <a:tblPr firstRow="1" bandRow="1">
-                <a:tableStyleId>{5C22544A-7EE6-4342-B048-85BDC9FD1C3A}</a:tableStyleId>
-              </a:tblPr>
-              <a:tblGrid>
-                <a:gridCol w="1050413">
-                  <a:extLst>
-                    <a:ext uri="{9D8B030D-6E8A-4147-A177-3AD203B41FA5}">
-                      <a16:colId xmlns:a16="http://schemas.microsoft.com/office/drawing/2014/main" val="1319760997"/>
-                    </a:ext>
-                  </a:extLst>
-                </a:gridCol>
-              </a:tblGrid>
-              <a:tr h="141461">
-                <a:tc>
-                  <a:txBody>
-                    <a:bodyPr/>
-                    <a:lstStyle/>
-                    <a:p>
-                      <a:r>
-                        <a:rPr lang="en-US" sz="900" dirty="0"/>
-                        <a:t>timeseries</a:t>
-                      </a:r>
-                    </a:p>
-                  </a:txBody>
-                  <a:tcPr/>
-                </a:tc>
-                <a:extLst>
-                  <a:ext uri="{0D108BD9-81ED-4DB2-BD59-A6C34878D82A}">
-                    <a16:rowId xmlns:a16="http://schemas.microsoft.com/office/drawing/2014/main" val="4107092155"/>
-                  </a:ext>
-                </a:extLst>
-              </a:tr>
-              <a:tr h="141461">
-                <a:tc>
-                  <a:txBody>
-                    <a:bodyPr/>
-                    <a:lstStyle/>
-                    <a:p>
-                      <a:r>
-                        <a:rPr lang="en-US" sz="900" dirty="0"/>
-                        <a:t>id</a:t>
-                      </a:r>
-                    </a:p>
-                  </a:txBody>
-                  <a:tcPr/>
-                </a:tc>
-                <a:extLst>
-                  <a:ext uri="{0D108BD9-81ED-4DB2-BD59-A6C34878D82A}">
-                    <a16:rowId xmlns:a16="http://schemas.microsoft.com/office/drawing/2014/main" val="3820176303"/>
-                  </a:ext>
-                </a:extLst>
-              </a:tr>
-              <a:tr h="141461">
-                <a:tc>
-                  <a:txBody>
-                    <a:bodyPr/>
-                    <a:lstStyle/>
-                    <a:p>
-                      <a:r>
-                        <a:rPr lang="en-US" sz="900" dirty="0"/>
-                        <a:t>meta_id</a:t>
-                      </a:r>
-                    </a:p>
-                  </a:txBody>
-                  <a:tcPr/>
-                </a:tc>
-                <a:extLst>
-                  <a:ext uri="{0D108BD9-81ED-4DB2-BD59-A6C34878D82A}">
-                    <a16:rowId xmlns:a16="http://schemas.microsoft.com/office/drawing/2014/main" val="4111631109"/>
-                  </a:ext>
-                </a:extLst>
-              </a:tr>
-              <a:tr h="141461">
-                <a:tc>
-                  <a:txBody>
-                    <a:bodyPr/>
-                    <a:lstStyle/>
-                    <a:p>
-                      <a:r>
-                        <a:rPr lang="en-US" sz="900" dirty="0"/>
-                        <a:t>datetime</a:t>
-                      </a:r>
-                    </a:p>
-                  </a:txBody>
-                  <a:tcPr/>
-                </a:tc>
-                <a:extLst>
-                  <a:ext uri="{0D108BD9-81ED-4DB2-BD59-A6C34878D82A}">
-                    <a16:rowId xmlns:a16="http://schemas.microsoft.com/office/drawing/2014/main" val="3731775451"/>
-                  </a:ext>
-                </a:extLst>
-              </a:tr>
-              <a:tr h="141461">
-                <a:tc>
-                  <a:txBody>
-                    <a:bodyPr/>
-                    <a:lstStyle/>
-                    <a:p>
-                      <a:r>
-                        <a:rPr lang="en-US" sz="900" dirty="0"/>
-                        <a:t>value</a:t>
-                      </a:r>
-                    </a:p>
-                  </a:txBody>
-                  <a:tcPr/>
-                </a:tc>
-                <a:extLst>
-                  <a:ext uri="{0D108BD9-81ED-4DB2-BD59-A6C34878D82A}">
-                    <a16:rowId xmlns:a16="http://schemas.microsoft.com/office/drawing/2014/main" val="128168508"/>
-                  </a:ext>
-                </a:extLst>
-              </a:tr>
-            </a:tbl>
-          </a:graphicData>
-        </a:graphic>
-      </p:graphicFrame>
+          <a:p>
+            <a:pPr algn="ctr"/>
+            <a:r>
+              <a:rPr lang="en-US" sz="1050" b="1" dirty="0"/>
+              <a:t>Locations</a:t>
+            </a:r>
+            <a:endParaRPr lang="en-US" sz="2400" b="1" dirty="0"/>
+          </a:p>
+        </p:txBody>
+      </p:sp>
       <p:graphicFrame>
         <p:nvGraphicFramePr>
           <p:cNvPr id="102" name="Table 101">
@@ -22218,14 +22302,14 @@
           <p:nvPr>
             <p:extLst>
               <p:ext uri="{D42A27DB-BD31-4B8C-83A1-F6EECF244321}">
-                <p14:modId xmlns:p14="http://schemas.microsoft.com/office/powerpoint/2010/main" val="1985439555"/>
+                <p14:modId xmlns:p14="http://schemas.microsoft.com/office/powerpoint/2010/main" val="2045860324"/>
               </p:ext>
             </p:extLst>
           </p:nvPr>
         </p:nvGraphicFramePr>
         <p:xfrm>
-          <a:off x="5842785" y="1795806"/>
-          <a:ext cx="1056132" cy="685800"/>
+          <a:off x="5860114" y="1862699"/>
+          <a:ext cx="1056132" cy="1798320"/>
         </p:xfrm>
         <a:graphic>
           <a:graphicData uri="http://schemas.openxmlformats.org/drawingml/2006/table">
@@ -22250,7 +22334,7 @@
                     <a:p>
                       <a:r>
                         <a:rPr lang="en-US" sz="900" dirty="0"/>
-                        <a:t>timeseries_meta</a:t>
+                        <a:t>Timeseries Meta</a:t>
                       </a:r>
                     </a:p>
                   </a:txBody>
@@ -22302,6 +22386,123 @@
                   </a:ext>
                 </a:extLst>
               </a:tr>
+              <a:tr h="141461">
+                <a:tc>
+                  <a:txBody>
+                    <a:bodyPr/>
+                    <a:lstStyle/>
+                    <a:p>
+                      <a:r>
+                        <a:rPr lang="en-US" sz="900" dirty="0"/>
+                        <a:t>file_uuid</a:t>
+                      </a:r>
+                    </a:p>
+                  </a:txBody>
+                  <a:tcPr/>
+                </a:tc>
+                <a:extLst>
+                  <a:ext uri="{0D108BD9-81ED-4DB2-BD59-A6C34878D82A}">
+                    <a16:rowId xmlns:a16="http://schemas.microsoft.com/office/drawing/2014/main" val="733446386"/>
+                  </a:ext>
+                </a:extLst>
+              </a:tr>
+              <a:tr h="141461">
+                <a:tc>
+                  <a:txBody>
+                    <a:bodyPr/>
+                    <a:lstStyle/>
+                    <a:p>
+                      <a:r>
+                        <a:rPr lang="en-US" sz="900" dirty="0"/>
+                        <a:t>original_filename</a:t>
+                      </a:r>
+                    </a:p>
+                  </a:txBody>
+                  <a:tcPr/>
+                </a:tc>
+                <a:extLst>
+                  <a:ext uri="{0D108BD9-81ED-4DB2-BD59-A6C34878D82A}">
+                    <a16:rowId xmlns:a16="http://schemas.microsoft.com/office/drawing/2014/main" val="1039707540"/>
+                  </a:ext>
+                </a:extLst>
+              </a:tr>
+              <a:tr h="141461">
+                <a:tc>
+                  <a:txBody>
+                    <a:bodyPr/>
+                    <a:lstStyle/>
+                    <a:p>
+                      <a:r>
+                        <a:rPr lang="en-US" sz="900" dirty="0"/>
+                        <a:t>start_date</a:t>
+                      </a:r>
+                    </a:p>
+                  </a:txBody>
+                  <a:tcPr/>
+                </a:tc>
+                <a:extLst>
+                  <a:ext uri="{0D108BD9-81ED-4DB2-BD59-A6C34878D82A}">
+                    <a16:rowId xmlns:a16="http://schemas.microsoft.com/office/drawing/2014/main" val="2782169720"/>
+                  </a:ext>
+                </a:extLst>
+              </a:tr>
+              <a:tr h="141461">
+                <a:tc>
+                  <a:txBody>
+                    <a:bodyPr/>
+                    <a:lstStyle/>
+                    <a:p>
+                      <a:r>
+                        <a:rPr lang="en-US" sz="900" dirty="0"/>
+                        <a:t>end_date</a:t>
+                      </a:r>
+                    </a:p>
+                  </a:txBody>
+                  <a:tcPr/>
+                </a:tc>
+                <a:extLst>
+                  <a:ext uri="{0D108BD9-81ED-4DB2-BD59-A6C34878D82A}">
+                    <a16:rowId xmlns:a16="http://schemas.microsoft.com/office/drawing/2014/main" val="1261337404"/>
+                  </a:ext>
+                </a:extLst>
+              </a:tr>
+              <a:tr h="141461">
+                <a:tc>
+                  <a:txBody>
+                    <a:bodyPr/>
+                    <a:lstStyle/>
+                    <a:p>
+                      <a:pPr marL="0" marR="0" lvl="0" indent="0" algn="l" defTabSz="457200" rtl="0" eaLnBrk="1" fontAlgn="auto" latinLnBrk="0" hangingPunct="1">
+                        <a:lnSpc>
+                          <a:spcPct val="100000"/>
+                        </a:lnSpc>
+                        <a:spcBef>
+                          <a:spcPts val="0"/>
+                        </a:spcBef>
+                        <a:spcAft>
+                          <a:spcPts val="0"/>
+                        </a:spcAft>
+                        <a:buClrTx/>
+                        <a:buSzTx/>
+                        <a:buFontTx/>
+                        <a:buNone/>
+                        <a:tabLst/>
+                        <a:defRPr/>
+                      </a:pPr>
+                      <a:r>
+                        <a:rPr lang="en-US" sz="700" dirty="0"/>
+                        <a:t>**attributes</a:t>
+                      </a:r>
+                    </a:p>
+                  </a:txBody>
+                  <a:tcPr/>
+                </a:tc>
+                <a:extLst>
+                  <a:ext uri="{0D108BD9-81ED-4DB2-BD59-A6C34878D82A}">
+                    <a16:rowId xmlns:a16="http://schemas.microsoft.com/office/drawing/2014/main" val="3056892457"/>
+                  </a:ext>
+                </a:extLst>
+              </a:tr>
             </a:tbl>
           </a:graphicData>
         </a:graphic>
@@ -22322,8 +22523,8 @@
         </p:nvCxnSpPr>
         <p:spPr>
           <a:xfrm flipV="1">
-            <a:off x="5663559" y="2144757"/>
-            <a:ext cx="1" cy="1130723"/>
+            <a:off x="5662757" y="2210047"/>
+            <a:ext cx="3644" cy="880705"/>
           </a:xfrm>
           <a:prstGeom prst="line">
             <a:avLst/>
@@ -22358,14 +22559,13 @@
           </p:cNvPr>
           <p:cNvCxnSpPr>
             <a:cxnSpLocks/>
-            <a:stCxn id="102" idx="1"/>
           </p:cNvCxnSpPr>
           <p:nvPr/>
         </p:nvCxnSpPr>
         <p:spPr>
-          <a:xfrm flipH="1">
-            <a:off x="5663559" y="2138706"/>
-            <a:ext cx="179226" cy="0"/>
+          <a:xfrm flipH="1" flipV="1">
+            <a:off x="5663559" y="2201770"/>
+            <a:ext cx="179225" cy="1"/>
           </a:xfrm>
           <a:prstGeom prst="line">
             <a:avLst/>
@@ -22405,7 +22605,7 @@
         </p:nvCxnSpPr>
         <p:spPr>
           <a:xfrm flipH="1">
-            <a:off x="4049258" y="3275480"/>
+            <a:off x="4049258" y="3090752"/>
             <a:ext cx="1614301" cy="0"/>
           </a:xfrm>
           <a:prstGeom prst="line">
@@ -22445,14 +22645,14 @@
           <p:nvPr>
             <p:extLst>
               <p:ext uri="{D42A27DB-BD31-4B8C-83A1-F6EECF244321}">
-                <p14:modId xmlns:p14="http://schemas.microsoft.com/office/powerpoint/2010/main" val="4246077735"/>
+                <p14:modId xmlns:p14="http://schemas.microsoft.com/office/powerpoint/2010/main" val="3049831539"/>
               </p:ext>
             </p:extLst>
           </p:nvPr>
         </p:nvGraphicFramePr>
         <p:xfrm>
-          <a:off x="4311628" y="2011661"/>
-          <a:ext cx="1058797" cy="1600200"/>
+          <a:off x="4372148" y="1834929"/>
+          <a:ext cx="998277" cy="1798320"/>
         </p:xfrm>
         <a:graphic>
           <a:graphicData uri="http://schemas.openxmlformats.org/drawingml/2006/table">
@@ -22461,7 +22661,7 @@
                 <a:tableStyleId>{5C22544A-7EE6-4342-B048-85BDC9FD1C3A}</a:tableStyleId>
               </a:tblPr>
               <a:tblGrid>
-                <a:gridCol w="1058797">
+                <a:gridCol w="998277">
                   <a:extLst>
                     <a:ext uri="{9D8B030D-6E8A-4147-A177-3AD203B41FA5}">
                       <a16:colId xmlns:a16="http://schemas.microsoft.com/office/drawing/2014/main" val="1319760997"/>
@@ -22476,10 +22676,9 @@
                     <a:lstStyle/>
                     <a:p>
                       <a:r>
-                        <a:rPr lang="en-US" sz="900" dirty="0" err="1"/>
-                        <a:t>loc_tech_param</a:t>
+                        <a:rPr lang="en-US" sz="900" dirty="0"/>
+                        <a:t>Loc_Tech_Param</a:t>
                       </a:r>
-                      <a:endParaRPr lang="en-US" sz="900" dirty="0"/>
                     </a:p>
                   </a:txBody>
                   <a:tcPr/>
@@ -22558,7 +22757,7 @@
                     <a:p>
                       <a:r>
                         <a:rPr lang="en-US" sz="900" dirty="0"/>
-                        <a:t>parameter_id</a:t>
+                        <a:t>parameter</a:t>
                       </a:r>
                     </a:p>
                   </a:txBody>
@@ -22607,6 +22806,43 @@
                 <a:extLst>
                   <a:ext uri="{0D108BD9-81ED-4DB2-BD59-A6C34878D82A}">
                     <a16:rowId xmlns:a16="http://schemas.microsoft.com/office/drawing/2014/main" val="2899562824"/>
+                  </a:ext>
+                </a:extLst>
+              </a:tr>
+              <a:tr h="141461">
+                <a:tc>
+                  <a:txBody>
+                    <a:bodyPr/>
+                    <a:lstStyle/>
+                    <a:p>
+                      <a:pPr marL="0" marR="0" lvl="0" indent="0" algn="l" defTabSz="457200" rtl="0" eaLnBrk="1" fontAlgn="auto" latinLnBrk="0" hangingPunct="1">
+                        <a:lnSpc>
+                          <a:spcPct val="100000"/>
+                        </a:lnSpc>
+                        <a:spcBef>
+                          <a:spcPts val="0"/>
+                        </a:spcBef>
+                        <a:spcAft>
+                          <a:spcPts val="0"/>
+                        </a:spcAft>
+                        <a:buClrTx/>
+                        <a:buSzTx/>
+                        <a:buFontTx/>
+                        <a:buNone/>
+                        <a:tabLst/>
+                        <a:defRPr/>
+                      </a:pPr>
+                      <a:r>
+                        <a:rPr lang="en-US" sz="700" dirty="0"/>
+                        <a:t>**attributes</a:t>
+                      </a:r>
+                    </a:p>
+                  </a:txBody>
+                  <a:tcPr/>
+                </a:tc>
+                <a:extLst>
+                  <a:ext uri="{0D108BD9-81ED-4DB2-BD59-A6C34878D82A}">
+                    <a16:rowId xmlns:a16="http://schemas.microsoft.com/office/drawing/2014/main" val="4250330053"/>
                   </a:ext>
                 </a:extLst>
               </a:tr>

</xml_diff>